<commit_message>
add Level zero for testing asset integration
</commit_message>
<xml_diff>
--- a/asset/level-over.pptx
+++ b/asset/level-over.pptx
@@ -104,6 +104,11 @@
       </a:defRPr>
     </a:lvl9pPr>
   </p:defaultTextStyle>
+  <p:extLst>
+    <p:ext uri="{EFAFB233-063F-42B5-8137-9DF3F51BA10A}">
+      <p15:sldGuideLst xmlns:p15="http://schemas.microsoft.com/office/powerpoint/2012/main"/>
+    </p:ext>
+  </p:extLst>
 </p:presentation>
 </file>
 
@@ -3342,65 +3347,26 @@
           <a:chExt cx="0" cy="0"/>
         </a:xfrm>
       </p:grpSpPr>
-      <p:pic>
-        <p:nvPicPr>
-          <p:cNvPr id="27" name="Picture 26" descr="Graphical user interface&#10;&#10;Description automatically generated with medium confidence">
-            <a:extLst>
-              <a:ext uri="{FF2B5EF4-FFF2-40B4-BE49-F238E27FC236}">
-                <a16:creationId xmlns:a16="http://schemas.microsoft.com/office/drawing/2014/main" id="{5F25ACAD-6245-0A56-CA2C-C269739A1C64}"/>
-              </a:ext>
-            </a:extLst>
-          </p:cNvPr>
-          <p:cNvPicPr>
-            <a:picLocks noChangeAspect="1"/>
-          </p:cNvPicPr>
+      <p:sp>
+        <p:nvSpPr>
+          <p:cNvPr id="9" name="Rectangle 8">
+            <a:extLst>
+              <a:ext uri="{FF2B5EF4-FFF2-40B4-BE49-F238E27FC236}">
+                <a16:creationId xmlns:a16="http://schemas.microsoft.com/office/drawing/2014/main" id="{BC20D272-F969-BCD8-D0BD-5BA36587A280}"/>
+              </a:ext>
+            </a:extLst>
+          </p:cNvPr>
+          <p:cNvSpPr/>
           <p:nvPr/>
-        </p:nvPicPr>
-        <p:blipFill>
-          <a:blip r:embed="rId2">
-            <a:extLst>
-              <a:ext uri="{28A0092B-C50C-407E-A947-70E740481C1C}">
-                <a14:useLocalDpi xmlns:a14="http://schemas.microsoft.com/office/drawing/2010/main" val="0"/>
-              </a:ext>
-            </a:extLst>
-          </a:blip>
-          <a:stretch>
-            <a:fillRect/>
-          </a:stretch>
-        </p:blipFill>
+        </p:nvSpPr>
         <p:spPr>
           <a:xfrm>
-            <a:off x="699418" y="314100"/>
-            <a:ext cx="9593014" cy="3219899"/>
+            <a:off x="9932020" y="735984"/>
+            <a:ext cx="349404" cy="312234"/>
           </a:xfrm>
           <a:prstGeom prst="rect">
             <a:avLst/>
           </a:prstGeom>
-        </p:spPr>
-      </p:pic>
-      <p:sp>
-        <p:nvSpPr>
-          <p:cNvPr id="10" name="Oval 9">
-            <a:extLst>
-              <a:ext uri="{FF2B5EF4-FFF2-40B4-BE49-F238E27FC236}">
-                <a16:creationId xmlns:a16="http://schemas.microsoft.com/office/drawing/2014/main" id="{30B33B2E-4CD6-EDFB-0A93-4795E9B2D34A}"/>
-              </a:ext>
-            </a:extLst>
-          </p:cNvPr>
-          <p:cNvSpPr/>
-          <p:nvPr/>
-        </p:nvSpPr>
-        <p:spPr>
-          <a:xfrm>
-            <a:off x="8920920" y="2776493"/>
-            <a:ext cx="273465" cy="264919"/>
-          </a:xfrm>
-          <a:prstGeom prst="ellipse">
-            <a:avLst/>
-          </a:prstGeom>
-          <a:solidFill>
-            <a:schemeClr val="bg1"/>
-          </a:solidFill>
         </p:spPr>
         <p:style>
           <a:lnRef idx="2">
@@ -3427,349 +3393,455 @@
           </a:p>
         </p:txBody>
       </p:sp>
-      <p:sp>
-        <p:nvSpPr>
-          <p:cNvPr id="11" name="Oval 10">
-            <a:extLst>
-              <a:ext uri="{FF2B5EF4-FFF2-40B4-BE49-F238E27FC236}">
-                <a16:creationId xmlns:a16="http://schemas.microsoft.com/office/drawing/2014/main" id="{713F1052-CA0C-3EAA-1A34-AC1B0257C69B}"/>
-              </a:ext>
-            </a:extLst>
-          </p:cNvPr>
-          <p:cNvSpPr/>
+      <p:pic>
+        <p:nvPicPr>
+          <p:cNvPr id="27" name="Picture 26" descr="Graphical user interface&#10;&#10;Description automatically generated with medium confidence">
+            <a:extLst>
+              <a:ext uri="{FF2B5EF4-FFF2-40B4-BE49-F238E27FC236}">
+                <a16:creationId xmlns:a16="http://schemas.microsoft.com/office/drawing/2014/main" id="{5F25ACAD-6245-0A56-CA2C-C269739A1C64}"/>
+              </a:ext>
+            </a:extLst>
+          </p:cNvPr>
+          <p:cNvPicPr>
+            <a:picLocks noChangeAspect="1"/>
+          </p:cNvPicPr>
           <p:nvPr/>
-        </p:nvSpPr>
+        </p:nvPicPr>
+        <p:blipFill>
+          <a:blip r:embed="rId2">
+            <a:extLst>
+              <a:ext uri="{28A0092B-C50C-407E-A947-70E740481C1C}">
+                <a14:useLocalDpi xmlns:a14="http://schemas.microsoft.com/office/drawing/2010/main" val="0"/>
+              </a:ext>
+            </a:extLst>
+          </a:blip>
+          <a:stretch>
+            <a:fillRect/>
+          </a:stretch>
+        </p:blipFill>
         <p:spPr>
           <a:xfrm>
-            <a:off x="3740744" y="2775069"/>
-            <a:ext cx="273465" cy="264919"/>
+            <a:off x="699418" y="1287022"/>
+            <a:ext cx="9593014" cy="3219899"/>
           </a:xfrm>
-          <a:prstGeom prst="ellipse">
+          <a:prstGeom prst="rect">
             <a:avLst/>
           </a:prstGeom>
-          <a:solidFill>
-            <a:schemeClr val="bg1"/>
-          </a:solidFill>
         </p:spPr>
-        <p:style>
-          <a:lnRef idx="2">
-            <a:schemeClr val="accent1">
-              <a:shade val="50000"/>
-            </a:schemeClr>
-          </a:lnRef>
-          <a:fillRef idx="1">
-            <a:schemeClr val="accent1"/>
-          </a:fillRef>
-          <a:effectRef idx="0">
-            <a:schemeClr val="accent1"/>
-          </a:effectRef>
-          <a:fontRef idx="minor">
-            <a:schemeClr val="lt1"/>
-          </a:fontRef>
-        </p:style>
-        <p:txBody>
-          <a:bodyPr rtlCol="0" anchor="ctr"/>
-          <a:lstStyle/>
-          <a:p>
-            <a:pPr algn="ctr"/>
-            <a:endParaRPr lang="en-GB"/>
-          </a:p>
-        </p:txBody>
-      </p:sp>
-      <p:sp>
-        <p:nvSpPr>
-          <p:cNvPr id="12" name="Oval 11">
-            <a:extLst>
-              <a:ext uri="{FF2B5EF4-FFF2-40B4-BE49-F238E27FC236}">
-                <a16:creationId xmlns:a16="http://schemas.microsoft.com/office/drawing/2014/main" id="{E10367EC-D38B-EC1D-03A0-05C2A87F07F0}"/>
-              </a:ext>
-            </a:extLst>
-          </p:cNvPr>
-          <p:cNvSpPr/>
+      </p:pic>
+      <p:grpSp>
+        <p:nvGrpSpPr>
+          <p:cNvPr id="37" name="Group 36">
+            <a:extLst>
+              <a:ext uri="{FF2B5EF4-FFF2-40B4-BE49-F238E27FC236}">
+                <a16:creationId xmlns:a16="http://schemas.microsoft.com/office/drawing/2014/main" id="{3D65FBA0-40A8-1B57-9FFD-0341A8330AAB}"/>
+              </a:ext>
+            </a:extLst>
+          </p:cNvPr>
+          <p:cNvGrpSpPr/>
           <p:nvPr/>
-        </p:nvSpPr>
-        <p:spPr>
+        </p:nvGrpSpPr>
+        <p:grpSpPr>
           <a:xfrm>
-            <a:off x="6157780" y="2756552"/>
-            <a:ext cx="273465" cy="264919"/>
+            <a:off x="2112842" y="3761165"/>
+            <a:ext cx="7111718" cy="609885"/>
+            <a:chOff x="2089982" y="3730685"/>
+            <a:chExt cx="7111718" cy="609885"/>
           </a:xfrm>
-          <a:prstGeom prst="ellipse">
-            <a:avLst/>
-          </a:prstGeom>
-          <a:solidFill>
-            <a:schemeClr val="bg1"/>
-          </a:solidFill>
-        </p:spPr>
-        <p:style>
-          <a:lnRef idx="2">
-            <a:schemeClr val="accent1">
-              <a:shade val="50000"/>
-            </a:schemeClr>
-          </a:lnRef>
-          <a:fillRef idx="1">
-            <a:schemeClr val="accent1"/>
-          </a:fillRef>
-          <a:effectRef idx="0">
-            <a:schemeClr val="accent1"/>
-          </a:effectRef>
-          <a:fontRef idx="minor">
-            <a:schemeClr val="lt1"/>
-          </a:fontRef>
-        </p:style>
-        <p:txBody>
-          <a:bodyPr rtlCol="0" anchor="ctr"/>
-          <a:lstStyle/>
-          <a:p>
-            <a:pPr algn="ctr"/>
-            <a:endParaRPr lang="en-GB"/>
-          </a:p>
-        </p:txBody>
-      </p:sp>
-      <p:sp>
-        <p:nvSpPr>
-          <p:cNvPr id="13" name="Oval 12">
-            <a:extLst>
-              <a:ext uri="{FF2B5EF4-FFF2-40B4-BE49-F238E27FC236}">
-                <a16:creationId xmlns:a16="http://schemas.microsoft.com/office/drawing/2014/main" id="{CA69D0CB-F8B2-5907-5960-2E8CA4982B6A}"/>
-              </a:ext>
-            </a:extLst>
-          </p:cNvPr>
-          <p:cNvSpPr/>
-          <p:nvPr/>
-        </p:nvSpPr>
-        <p:spPr>
-          <a:xfrm>
-            <a:off x="4925761" y="3131143"/>
-            <a:ext cx="273465" cy="264919"/>
-          </a:xfrm>
-          <a:prstGeom prst="ellipse">
-            <a:avLst/>
-          </a:prstGeom>
-          <a:solidFill>
-            <a:schemeClr val="bg1"/>
-          </a:solidFill>
-        </p:spPr>
-        <p:style>
-          <a:lnRef idx="2">
-            <a:schemeClr val="accent1">
-              <a:shade val="50000"/>
-            </a:schemeClr>
-          </a:lnRef>
-          <a:fillRef idx="1">
-            <a:schemeClr val="accent1"/>
-          </a:fillRef>
-          <a:effectRef idx="0">
-            <a:schemeClr val="accent1"/>
-          </a:effectRef>
-          <a:fontRef idx="minor">
-            <a:schemeClr val="lt1"/>
-          </a:fontRef>
-        </p:style>
-        <p:txBody>
-          <a:bodyPr rtlCol="0" anchor="ctr"/>
-          <a:lstStyle/>
-          <a:p>
-            <a:pPr algn="ctr"/>
-            <a:endParaRPr lang="en-GB"/>
-          </a:p>
-        </p:txBody>
-      </p:sp>
-      <p:sp>
-        <p:nvSpPr>
-          <p:cNvPr id="14" name="Oval 13">
-            <a:extLst>
-              <a:ext uri="{FF2B5EF4-FFF2-40B4-BE49-F238E27FC236}">
-                <a16:creationId xmlns:a16="http://schemas.microsoft.com/office/drawing/2014/main" id="{B0C7EA53-F1DB-724A-6E34-CAE8F7F5573A}"/>
-              </a:ext>
-            </a:extLst>
-          </p:cNvPr>
-          <p:cNvSpPr/>
-          <p:nvPr/>
-        </p:nvSpPr>
-        <p:spPr>
-          <a:xfrm>
-            <a:off x="7898274" y="2770795"/>
-            <a:ext cx="273465" cy="264919"/>
-          </a:xfrm>
-          <a:prstGeom prst="ellipse">
-            <a:avLst/>
-          </a:prstGeom>
-          <a:solidFill>
-            <a:schemeClr val="bg1"/>
-          </a:solidFill>
-        </p:spPr>
-        <p:style>
-          <a:lnRef idx="2">
-            <a:schemeClr val="accent1">
-              <a:shade val="50000"/>
-            </a:schemeClr>
-          </a:lnRef>
-          <a:fillRef idx="1">
-            <a:schemeClr val="accent1"/>
-          </a:fillRef>
-          <a:effectRef idx="0">
-            <a:schemeClr val="accent1"/>
-          </a:effectRef>
-          <a:fontRef idx="minor">
-            <a:schemeClr val="lt1"/>
-          </a:fontRef>
-        </p:style>
-        <p:txBody>
-          <a:bodyPr rtlCol="0" anchor="ctr"/>
-          <a:lstStyle/>
-          <a:p>
-            <a:pPr algn="ctr"/>
-            <a:endParaRPr lang="en-GB"/>
-          </a:p>
-        </p:txBody>
-      </p:sp>
-      <p:sp>
-        <p:nvSpPr>
-          <p:cNvPr id="15" name="Oval 14">
-            <a:extLst>
-              <a:ext uri="{FF2B5EF4-FFF2-40B4-BE49-F238E27FC236}">
-                <a16:creationId xmlns:a16="http://schemas.microsoft.com/office/drawing/2014/main" id="{747B624D-62EC-CC4B-EF18-FE38D31BE0D9}"/>
-              </a:ext>
-            </a:extLst>
-          </p:cNvPr>
-          <p:cNvSpPr/>
-          <p:nvPr/>
-        </p:nvSpPr>
-        <p:spPr>
-          <a:xfrm>
-            <a:off x="6649163" y="2777918"/>
-            <a:ext cx="273465" cy="264919"/>
-          </a:xfrm>
-          <a:prstGeom prst="ellipse">
-            <a:avLst/>
-          </a:prstGeom>
-          <a:solidFill>
-            <a:schemeClr val="bg1"/>
-          </a:solidFill>
-        </p:spPr>
-        <p:style>
-          <a:lnRef idx="2">
-            <a:schemeClr val="accent1">
-              <a:shade val="50000"/>
-            </a:schemeClr>
-          </a:lnRef>
-          <a:fillRef idx="1">
-            <a:schemeClr val="accent1"/>
-          </a:fillRef>
-          <a:effectRef idx="0">
-            <a:schemeClr val="accent1"/>
-          </a:effectRef>
-          <a:fontRef idx="minor">
-            <a:schemeClr val="lt1"/>
-          </a:fontRef>
-        </p:style>
-        <p:txBody>
-          <a:bodyPr rtlCol="0" anchor="ctr"/>
-          <a:lstStyle/>
-          <a:p>
-            <a:pPr algn="ctr"/>
-            <a:endParaRPr lang="en-GB"/>
-          </a:p>
-        </p:txBody>
-      </p:sp>
-      <p:sp>
-        <p:nvSpPr>
-          <p:cNvPr id="16" name="Oval 15">
-            <a:extLst>
-              <a:ext uri="{FF2B5EF4-FFF2-40B4-BE49-F238E27FC236}">
-                <a16:creationId xmlns:a16="http://schemas.microsoft.com/office/drawing/2014/main" id="{A8DEA2B3-4952-5564-826A-C22D8D01A501}"/>
-              </a:ext>
-            </a:extLst>
-          </p:cNvPr>
-          <p:cNvSpPr/>
-          <p:nvPr/>
-        </p:nvSpPr>
-        <p:spPr>
-          <a:xfrm>
-            <a:off x="2089982" y="2773644"/>
-            <a:ext cx="273465" cy="264919"/>
-          </a:xfrm>
-          <a:prstGeom prst="ellipse">
-            <a:avLst/>
-          </a:prstGeom>
-          <a:solidFill>
-            <a:schemeClr val="bg1"/>
-          </a:solidFill>
-        </p:spPr>
-        <p:style>
-          <a:lnRef idx="2">
-            <a:schemeClr val="accent1">
-              <a:shade val="50000"/>
-            </a:schemeClr>
-          </a:lnRef>
-          <a:fillRef idx="1">
-            <a:schemeClr val="accent1"/>
-          </a:fillRef>
-          <a:effectRef idx="0">
-            <a:schemeClr val="accent1"/>
-          </a:effectRef>
-          <a:fontRef idx="minor">
-            <a:schemeClr val="lt1"/>
-          </a:fontRef>
-        </p:style>
-        <p:txBody>
-          <a:bodyPr rtlCol="0" anchor="ctr"/>
-          <a:lstStyle/>
-          <a:p>
-            <a:pPr algn="ctr"/>
-            <a:endParaRPr lang="en-GB"/>
-          </a:p>
-        </p:txBody>
-      </p:sp>
-      <p:sp>
-        <p:nvSpPr>
-          <p:cNvPr id="17" name="Oval 16">
-            <a:extLst>
-              <a:ext uri="{FF2B5EF4-FFF2-40B4-BE49-F238E27FC236}">
-                <a16:creationId xmlns:a16="http://schemas.microsoft.com/office/drawing/2014/main" id="{E24AE2BC-19F8-D11D-31E6-C865D40C9B71}"/>
-              </a:ext>
-            </a:extLst>
-          </p:cNvPr>
-          <p:cNvSpPr/>
-          <p:nvPr/>
-        </p:nvSpPr>
-        <p:spPr>
-          <a:xfrm>
-            <a:off x="3413156" y="2772220"/>
-            <a:ext cx="273465" cy="264919"/>
-          </a:xfrm>
-          <a:prstGeom prst="ellipse">
-            <a:avLst/>
-          </a:prstGeom>
-          <a:solidFill>
-            <a:schemeClr val="bg1"/>
-          </a:solidFill>
-        </p:spPr>
-        <p:style>
-          <a:lnRef idx="2">
-            <a:schemeClr val="accent1">
-              <a:shade val="50000"/>
-            </a:schemeClr>
-          </a:lnRef>
-          <a:fillRef idx="1">
-            <a:schemeClr val="accent1"/>
-          </a:fillRef>
-          <a:effectRef idx="0">
-            <a:schemeClr val="accent1"/>
-          </a:effectRef>
-          <a:fontRef idx="minor">
-            <a:schemeClr val="lt1"/>
-          </a:fontRef>
-        </p:style>
-        <p:txBody>
-          <a:bodyPr rtlCol="0" anchor="ctr"/>
-          <a:lstStyle/>
-          <a:p>
-            <a:pPr algn="ctr"/>
-            <a:endParaRPr lang="en-GB"/>
-          </a:p>
-        </p:txBody>
-      </p:sp>
+        </p:grpSpPr>
+        <p:sp>
+          <p:nvSpPr>
+            <p:cNvPr id="10" name="Oval 9">
+              <a:extLst>
+                <a:ext uri="{FF2B5EF4-FFF2-40B4-BE49-F238E27FC236}">
+                  <a16:creationId xmlns:a16="http://schemas.microsoft.com/office/drawing/2014/main" id="{30B33B2E-4CD6-EDFB-0A93-4795E9B2D34A}"/>
+                </a:ext>
+              </a:extLst>
+            </p:cNvPr>
+            <p:cNvSpPr/>
+            <p:nvPr/>
+          </p:nvSpPr>
+          <p:spPr>
+            <a:xfrm>
+              <a:off x="8928235" y="3742100"/>
+              <a:ext cx="273465" cy="264919"/>
+            </a:xfrm>
+            <a:prstGeom prst="ellipse">
+              <a:avLst/>
+            </a:prstGeom>
+            <a:solidFill>
+              <a:schemeClr val="bg1"/>
+            </a:solidFill>
+          </p:spPr>
+          <p:style>
+            <a:lnRef idx="2">
+              <a:schemeClr val="accent1">
+                <a:shade val="50000"/>
+              </a:schemeClr>
+            </a:lnRef>
+            <a:fillRef idx="1">
+              <a:schemeClr val="accent1"/>
+            </a:fillRef>
+            <a:effectRef idx="0">
+              <a:schemeClr val="accent1"/>
+            </a:effectRef>
+            <a:fontRef idx="minor">
+              <a:schemeClr val="lt1"/>
+            </a:fontRef>
+          </p:style>
+          <p:txBody>
+            <a:bodyPr rtlCol="0" anchor="ctr"/>
+            <a:lstStyle/>
+            <a:p>
+              <a:pPr algn="ctr"/>
+              <a:endParaRPr lang="en-GB"/>
+            </a:p>
+          </p:txBody>
+        </p:sp>
+        <p:sp>
+          <p:nvSpPr>
+            <p:cNvPr id="11" name="Oval 10">
+              <a:extLst>
+                <a:ext uri="{FF2B5EF4-FFF2-40B4-BE49-F238E27FC236}">
+                  <a16:creationId xmlns:a16="http://schemas.microsoft.com/office/drawing/2014/main" id="{713F1052-CA0C-3EAA-1A34-AC1B0257C69B}"/>
+                </a:ext>
+              </a:extLst>
+            </p:cNvPr>
+            <p:cNvSpPr/>
+            <p:nvPr/>
+          </p:nvSpPr>
+          <p:spPr>
+            <a:xfrm>
+              <a:off x="4891364" y="4075651"/>
+              <a:ext cx="273465" cy="264919"/>
+            </a:xfrm>
+            <a:prstGeom prst="ellipse">
+              <a:avLst/>
+            </a:prstGeom>
+            <a:solidFill>
+              <a:schemeClr val="bg1"/>
+            </a:solidFill>
+          </p:spPr>
+          <p:style>
+            <a:lnRef idx="2">
+              <a:schemeClr val="accent1">
+                <a:shade val="50000"/>
+              </a:schemeClr>
+            </a:lnRef>
+            <a:fillRef idx="1">
+              <a:schemeClr val="accent1"/>
+            </a:fillRef>
+            <a:effectRef idx="0">
+              <a:schemeClr val="accent1"/>
+            </a:effectRef>
+            <a:fontRef idx="minor">
+              <a:schemeClr val="lt1"/>
+            </a:fontRef>
+          </p:style>
+          <p:txBody>
+            <a:bodyPr rtlCol="0" anchor="ctr"/>
+            <a:lstStyle/>
+            <a:p>
+              <a:pPr algn="ctr"/>
+              <a:endParaRPr lang="en-GB" dirty="0"/>
+            </a:p>
+          </p:txBody>
+        </p:sp>
+        <p:sp>
+          <p:nvSpPr>
+            <p:cNvPr id="12" name="Oval 11">
+              <a:extLst>
+                <a:ext uri="{FF2B5EF4-FFF2-40B4-BE49-F238E27FC236}">
+                  <a16:creationId xmlns:a16="http://schemas.microsoft.com/office/drawing/2014/main" id="{E10367EC-D38B-EC1D-03A0-05C2A87F07F0}"/>
+                </a:ext>
+              </a:extLst>
+            </p:cNvPr>
+            <p:cNvSpPr/>
+            <p:nvPr/>
+          </p:nvSpPr>
+          <p:spPr>
+            <a:xfrm>
+              <a:off x="6127300" y="3744714"/>
+              <a:ext cx="273465" cy="264919"/>
+            </a:xfrm>
+            <a:prstGeom prst="ellipse">
+              <a:avLst/>
+            </a:prstGeom>
+            <a:solidFill>
+              <a:schemeClr val="bg1"/>
+            </a:solidFill>
+          </p:spPr>
+          <p:style>
+            <a:lnRef idx="2">
+              <a:schemeClr val="accent1">
+                <a:shade val="50000"/>
+              </a:schemeClr>
+            </a:lnRef>
+            <a:fillRef idx="1">
+              <a:schemeClr val="accent1"/>
+            </a:fillRef>
+            <a:effectRef idx="0">
+              <a:schemeClr val="accent1"/>
+            </a:effectRef>
+            <a:fontRef idx="minor">
+              <a:schemeClr val="lt1"/>
+            </a:fontRef>
+          </p:style>
+          <p:txBody>
+            <a:bodyPr rtlCol="0" anchor="ctr"/>
+            <a:lstStyle/>
+            <a:p>
+              <a:pPr algn="ctr"/>
+              <a:endParaRPr lang="en-GB"/>
+            </a:p>
+          </p:txBody>
+        </p:sp>
+        <p:sp>
+          <p:nvSpPr>
+            <p:cNvPr id="13" name="Oval 12">
+              <a:extLst>
+                <a:ext uri="{FF2B5EF4-FFF2-40B4-BE49-F238E27FC236}">
+                  <a16:creationId xmlns:a16="http://schemas.microsoft.com/office/drawing/2014/main" id="{CA69D0CB-F8B2-5907-5960-2E8CA4982B6A}"/>
+                </a:ext>
+              </a:extLst>
+            </p:cNvPr>
+            <p:cNvSpPr/>
+            <p:nvPr/>
+          </p:nvSpPr>
+          <p:spPr>
+            <a:xfrm>
+              <a:off x="3996121" y="3730685"/>
+              <a:ext cx="273465" cy="264919"/>
+            </a:xfrm>
+            <a:prstGeom prst="ellipse">
+              <a:avLst/>
+            </a:prstGeom>
+            <a:solidFill>
+              <a:schemeClr val="bg1"/>
+            </a:solidFill>
+          </p:spPr>
+          <p:style>
+            <a:lnRef idx="2">
+              <a:schemeClr val="accent1">
+                <a:shade val="50000"/>
+              </a:schemeClr>
+            </a:lnRef>
+            <a:fillRef idx="1">
+              <a:schemeClr val="accent1"/>
+            </a:fillRef>
+            <a:effectRef idx="0">
+              <a:schemeClr val="accent1"/>
+            </a:effectRef>
+            <a:fontRef idx="minor">
+              <a:schemeClr val="lt1"/>
+            </a:fontRef>
+          </p:style>
+          <p:txBody>
+            <a:bodyPr rtlCol="0" anchor="ctr"/>
+            <a:lstStyle/>
+            <a:p>
+              <a:pPr algn="ctr"/>
+              <a:endParaRPr lang="en-GB" dirty="0"/>
+            </a:p>
+          </p:txBody>
+        </p:sp>
+        <p:sp>
+          <p:nvSpPr>
+            <p:cNvPr id="14" name="Oval 13">
+              <a:extLst>
+                <a:ext uri="{FF2B5EF4-FFF2-40B4-BE49-F238E27FC236}">
+                  <a16:creationId xmlns:a16="http://schemas.microsoft.com/office/drawing/2014/main" id="{B0C7EA53-F1DB-724A-6E34-CAE8F7F5573A}"/>
+                </a:ext>
+              </a:extLst>
+            </p:cNvPr>
+            <p:cNvSpPr/>
+            <p:nvPr/>
+          </p:nvSpPr>
+          <p:spPr>
+            <a:xfrm>
+              <a:off x="7898274" y="3743717"/>
+              <a:ext cx="273465" cy="264919"/>
+            </a:xfrm>
+            <a:prstGeom prst="ellipse">
+              <a:avLst/>
+            </a:prstGeom>
+            <a:solidFill>
+              <a:schemeClr val="bg1"/>
+            </a:solidFill>
+          </p:spPr>
+          <p:style>
+            <a:lnRef idx="2">
+              <a:schemeClr val="accent1">
+                <a:shade val="50000"/>
+              </a:schemeClr>
+            </a:lnRef>
+            <a:fillRef idx="1">
+              <a:schemeClr val="accent1"/>
+            </a:fillRef>
+            <a:effectRef idx="0">
+              <a:schemeClr val="accent1"/>
+            </a:effectRef>
+            <a:fontRef idx="minor">
+              <a:schemeClr val="lt1"/>
+            </a:fontRef>
+          </p:style>
+          <p:txBody>
+            <a:bodyPr rtlCol="0" anchor="ctr"/>
+            <a:lstStyle/>
+            <a:p>
+              <a:pPr algn="ctr"/>
+              <a:endParaRPr lang="en-GB"/>
+            </a:p>
+          </p:txBody>
+        </p:sp>
+        <p:sp>
+          <p:nvSpPr>
+            <p:cNvPr id="15" name="Oval 14">
+              <a:extLst>
+                <a:ext uri="{FF2B5EF4-FFF2-40B4-BE49-F238E27FC236}">
+                  <a16:creationId xmlns:a16="http://schemas.microsoft.com/office/drawing/2014/main" id="{747B624D-62EC-CC4B-EF18-FE38D31BE0D9}"/>
+                </a:ext>
+              </a:extLst>
+            </p:cNvPr>
+            <p:cNvSpPr/>
+            <p:nvPr/>
+          </p:nvSpPr>
+          <p:spPr>
+            <a:xfrm>
+              <a:off x="6580583" y="3735600"/>
+              <a:ext cx="273465" cy="264919"/>
+            </a:xfrm>
+            <a:prstGeom prst="ellipse">
+              <a:avLst/>
+            </a:prstGeom>
+            <a:solidFill>
+              <a:schemeClr val="bg1"/>
+            </a:solidFill>
+          </p:spPr>
+          <p:style>
+            <a:lnRef idx="2">
+              <a:schemeClr val="accent1">
+                <a:shade val="50000"/>
+              </a:schemeClr>
+            </a:lnRef>
+            <a:fillRef idx="1">
+              <a:schemeClr val="accent1"/>
+            </a:fillRef>
+            <a:effectRef idx="0">
+              <a:schemeClr val="accent1"/>
+            </a:effectRef>
+            <a:fontRef idx="minor">
+              <a:schemeClr val="lt1"/>
+            </a:fontRef>
+          </p:style>
+          <p:txBody>
+            <a:bodyPr rtlCol="0" anchor="ctr"/>
+            <a:lstStyle/>
+            <a:p>
+              <a:pPr algn="ctr"/>
+              <a:endParaRPr lang="en-GB" dirty="0"/>
+            </a:p>
+          </p:txBody>
+        </p:sp>
+        <p:sp>
+          <p:nvSpPr>
+            <p:cNvPr id="16" name="Oval 15">
+              <a:extLst>
+                <a:ext uri="{FF2B5EF4-FFF2-40B4-BE49-F238E27FC236}">
+                  <a16:creationId xmlns:a16="http://schemas.microsoft.com/office/drawing/2014/main" id="{A8DEA2B3-4952-5564-826A-C22D8D01A501}"/>
+                </a:ext>
+              </a:extLst>
+            </p:cNvPr>
+            <p:cNvSpPr/>
+            <p:nvPr/>
+          </p:nvSpPr>
+          <p:spPr>
+            <a:xfrm>
+              <a:off x="2089982" y="3746566"/>
+              <a:ext cx="273465" cy="264919"/>
+            </a:xfrm>
+            <a:prstGeom prst="ellipse">
+              <a:avLst/>
+            </a:prstGeom>
+            <a:solidFill>
+              <a:schemeClr val="bg1"/>
+            </a:solidFill>
+          </p:spPr>
+          <p:style>
+            <a:lnRef idx="2">
+              <a:schemeClr val="accent1">
+                <a:shade val="50000"/>
+              </a:schemeClr>
+            </a:lnRef>
+            <a:fillRef idx="1">
+              <a:schemeClr val="accent1"/>
+            </a:fillRef>
+            <a:effectRef idx="0">
+              <a:schemeClr val="accent1"/>
+            </a:effectRef>
+            <a:fontRef idx="minor">
+              <a:schemeClr val="lt1"/>
+            </a:fontRef>
+          </p:style>
+          <p:txBody>
+            <a:bodyPr rtlCol="0" anchor="ctr"/>
+            <a:lstStyle/>
+            <a:p>
+              <a:pPr algn="ctr"/>
+              <a:endParaRPr lang="en-GB"/>
+            </a:p>
+          </p:txBody>
+        </p:sp>
+        <p:sp>
+          <p:nvSpPr>
+            <p:cNvPr id="17" name="Oval 16">
+              <a:extLst>
+                <a:ext uri="{FF2B5EF4-FFF2-40B4-BE49-F238E27FC236}">
+                  <a16:creationId xmlns:a16="http://schemas.microsoft.com/office/drawing/2014/main" id="{E24AE2BC-19F8-D11D-31E6-C865D40C9B71}"/>
+                </a:ext>
+              </a:extLst>
+            </p:cNvPr>
+            <p:cNvSpPr/>
+            <p:nvPr/>
+          </p:nvSpPr>
+          <p:spPr>
+            <a:xfrm>
+              <a:off x="3413156" y="3745142"/>
+              <a:ext cx="273465" cy="264919"/>
+            </a:xfrm>
+            <a:prstGeom prst="ellipse">
+              <a:avLst/>
+            </a:prstGeom>
+            <a:solidFill>
+              <a:schemeClr val="bg1"/>
+            </a:solidFill>
+          </p:spPr>
+          <p:style>
+            <a:lnRef idx="2">
+              <a:schemeClr val="accent1">
+                <a:shade val="50000"/>
+              </a:schemeClr>
+            </a:lnRef>
+            <a:fillRef idx="1">
+              <a:schemeClr val="accent1"/>
+            </a:fillRef>
+            <a:effectRef idx="0">
+              <a:schemeClr val="accent1"/>
+            </a:effectRef>
+            <a:fontRef idx="minor">
+              <a:schemeClr val="lt1"/>
+            </a:fontRef>
+          </p:style>
+          <p:txBody>
+            <a:bodyPr rtlCol="0" anchor="ctr"/>
+            <a:lstStyle/>
+            <a:p>
+              <a:pPr algn="ctr"/>
+              <a:endParaRPr lang="en-GB"/>
+            </a:p>
+          </p:txBody>
+        </p:sp>
+      </p:grpSp>
       <p:pic>
         <p:nvPicPr>
           <p:cNvPr id="19" name="Picture 18">
@@ -3798,7 +3870,7 @@
         </p:blipFill>
         <p:spPr>
           <a:xfrm>
-            <a:off x="3159986" y="3101857"/>
+            <a:off x="3129506" y="4090019"/>
             <a:ext cx="1905000" cy="361950"/>
           </a:xfrm>
           <a:prstGeom prst="rect">
@@ -3834,7 +3906,7 @@
         </p:blipFill>
         <p:spPr>
           <a:xfrm>
-            <a:off x="5634443" y="3080940"/>
+            <a:off x="5634443" y="4061482"/>
             <a:ext cx="1905000" cy="361950"/>
           </a:xfrm>
           <a:prstGeom prst="rect">
@@ -3870,7 +3942,7 @@
         </p:blipFill>
         <p:spPr>
           <a:xfrm>
-            <a:off x="5340911" y="4010970"/>
+            <a:off x="5299094" y="6282637"/>
             <a:ext cx="381000" cy="381000"/>
           </a:xfrm>
           <a:prstGeom prst="rect">
@@ -3878,6 +3950,413 @@
           </a:prstGeom>
         </p:spPr>
       </p:pic>
+      <p:sp>
+        <p:nvSpPr>
+          <p:cNvPr id="2" name="TextBox 1">
+            <a:extLst>
+              <a:ext uri="{FF2B5EF4-FFF2-40B4-BE49-F238E27FC236}">
+                <a16:creationId xmlns:a16="http://schemas.microsoft.com/office/drawing/2014/main" id="{771F7CB3-C58B-ED5F-64AA-AC1BF90E157C}"/>
+              </a:ext>
+            </a:extLst>
+          </p:cNvPr>
+          <p:cNvSpPr txBox="1"/>
+          <p:nvPr/>
+        </p:nvSpPr>
+        <p:spPr>
+          <a:xfrm>
+            <a:off x="636425" y="716893"/>
+            <a:ext cx="3869737" cy="523220"/>
+          </a:xfrm>
+          <a:prstGeom prst="rect">
+            <a:avLst/>
+          </a:prstGeom>
+          <a:noFill/>
+        </p:spPr>
+        <p:txBody>
+          <a:bodyPr wrap="square" rtlCol="0">
+            <a:spAutoFit/>
+          </a:bodyPr>
+          <a:lstStyle/>
+          <a:p>
+            <a:r>
+              <a:rPr lang="en-GB" sz="2800" dirty="0"/>
+              <a:t>Level end and scoring</a:t>
+            </a:r>
+          </a:p>
+        </p:txBody>
+      </p:sp>
+      <p:sp>
+        <p:nvSpPr>
+          <p:cNvPr id="34" name="TextBox 33">
+            <a:extLst>
+              <a:ext uri="{FF2B5EF4-FFF2-40B4-BE49-F238E27FC236}">
+                <a16:creationId xmlns:a16="http://schemas.microsoft.com/office/drawing/2014/main" id="{ECC2BE03-1915-BF49-6518-F7CBB93B3337}"/>
+              </a:ext>
+            </a:extLst>
+          </p:cNvPr>
+          <p:cNvSpPr txBox="1"/>
+          <p:nvPr/>
+        </p:nvSpPr>
+        <p:spPr>
+          <a:xfrm>
+            <a:off x="5741216" y="4490317"/>
+            <a:ext cx="601062" cy="400110"/>
+          </a:xfrm>
+          <a:prstGeom prst="rect">
+            <a:avLst/>
+          </a:prstGeom>
+          <a:noFill/>
+        </p:spPr>
+        <p:txBody>
+          <a:bodyPr wrap="square" rtlCol="0">
+            <a:spAutoFit/>
+          </a:bodyPr>
+          <a:lstStyle/>
+          <a:p>
+            <a:r>
+              <a:rPr lang="en-GB" sz="2000" dirty="0">
+                <a:solidFill>
+                  <a:schemeClr val="bg1"/>
+                </a:solidFill>
+              </a:rPr>
+              <a:t>100</a:t>
+            </a:r>
+          </a:p>
+        </p:txBody>
+      </p:sp>
+      <p:grpSp>
+        <p:nvGrpSpPr>
+          <p:cNvPr id="5" name="Group 4">
+            <a:extLst>
+              <a:ext uri="{FF2B5EF4-FFF2-40B4-BE49-F238E27FC236}">
+                <a16:creationId xmlns:a16="http://schemas.microsoft.com/office/drawing/2014/main" id="{9B797146-E55C-E8F4-E039-75FBBFA7A836}"/>
+              </a:ext>
+            </a:extLst>
+          </p:cNvPr>
+          <p:cNvGrpSpPr/>
+          <p:nvPr/>
+        </p:nvGrpSpPr>
+        <p:grpSpPr>
+          <a:xfrm>
+            <a:off x="2836590" y="620290"/>
+            <a:ext cx="7568791" cy="659086"/>
+            <a:chOff x="1899516" y="3389379"/>
+            <a:chExt cx="7568791" cy="659086"/>
+          </a:xfrm>
+        </p:grpSpPr>
+        <p:sp>
+          <p:nvSpPr>
+            <p:cNvPr id="18" name="TextBox 17">
+              <a:extLst>
+                <a:ext uri="{FF2B5EF4-FFF2-40B4-BE49-F238E27FC236}">
+                  <a16:creationId xmlns:a16="http://schemas.microsoft.com/office/drawing/2014/main" id="{06252F4C-7B1E-EAE7-75F0-69D44D862A6D}"/>
+                </a:ext>
+              </a:extLst>
+            </p:cNvPr>
+            <p:cNvSpPr txBox="1"/>
+            <p:nvPr/>
+          </p:nvSpPr>
+          <p:spPr>
+            <a:xfrm>
+              <a:off x="4944574" y="3648355"/>
+              <a:ext cx="601062" cy="400110"/>
+            </a:xfrm>
+            <a:prstGeom prst="rect">
+              <a:avLst/>
+            </a:prstGeom>
+            <a:noFill/>
+          </p:spPr>
+          <p:txBody>
+            <a:bodyPr wrap="square" rtlCol="0">
+              <a:spAutoFit/>
+            </a:bodyPr>
+            <a:lstStyle/>
+            <a:p>
+              <a:r>
+                <a:rPr lang="en-GB" sz="2000" dirty="0">
+                  <a:solidFill>
+                    <a:schemeClr val="bg1"/>
+                  </a:solidFill>
+                </a:rPr>
+                <a:t>100</a:t>
+              </a:r>
+            </a:p>
+          </p:txBody>
+        </p:sp>
+        <p:sp>
+          <p:nvSpPr>
+            <p:cNvPr id="29" name="TextBox 28">
+              <a:extLst>
+                <a:ext uri="{FF2B5EF4-FFF2-40B4-BE49-F238E27FC236}">
+                  <a16:creationId xmlns:a16="http://schemas.microsoft.com/office/drawing/2014/main" id="{D1E90E81-F0AE-E959-1CE8-8673BCBCBF31}"/>
+                </a:ext>
+              </a:extLst>
+            </p:cNvPr>
+            <p:cNvSpPr txBox="1"/>
+            <p:nvPr/>
+          </p:nvSpPr>
+          <p:spPr>
+            <a:xfrm>
+              <a:off x="6603190" y="3406448"/>
+              <a:ext cx="601062" cy="400110"/>
+            </a:xfrm>
+            <a:prstGeom prst="rect">
+              <a:avLst/>
+            </a:prstGeom>
+            <a:noFill/>
+          </p:spPr>
+          <p:txBody>
+            <a:bodyPr wrap="square" rtlCol="0">
+              <a:spAutoFit/>
+            </a:bodyPr>
+            <a:lstStyle/>
+            <a:p>
+              <a:r>
+                <a:rPr lang="en-GB" sz="2000" dirty="0">
+                  <a:solidFill>
+                    <a:schemeClr val="bg1"/>
+                  </a:solidFill>
+                </a:rPr>
+                <a:t>60</a:t>
+              </a:r>
+            </a:p>
+          </p:txBody>
+        </p:sp>
+        <p:sp>
+          <p:nvSpPr>
+            <p:cNvPr id="30" name="TextBox 29">
+              <a:extLst>
+                <a:ext uri="{FF2B5EF4-FFF2-40B4-BE49-F238E27FC236}">
+                  <a16:creationId xmlns:a16="http://schemas.microsoft.com/office/drawing/2014/main" id="{564F5939-0AD3-4A0F-FA2F-D61232EA5DBF}"/>
+                </a:ext>
+              </a:extLst>
+            </p:cNvPr>
+            <p:cNvSpPr txBox="1"/>
+            <p:nvPr/>
+          </p:nvSpPr>
+          <p:spPr>
+            <a:xfrm>
+              <a:off x="6016756" y="3397922"/>
+              <a:ext cx="601062" cy="400110"/>
+            </a:xfrm>
+            <a:prstGeom prst="rect">
+              <a:avLst/>
+            </a:prstGeom>
+            <a:noFill/>
+          </p:spPr>
+          <p:txBody>
+            <a:bodyPr wrap="square" rtlCol="0">
+              <a:spAutoFit/>
+            </a:bodyPr>
+            <a:lstStyle/>
+            <a:p>
+              <a:r>
+                <a:rPr lang="en-GB" sz="2000" dirty="0">
+                  <a:solidFill>
+                    <a:schemeClr val="bg1"/>
+                  </a:solidFill>
+                </a:rPr>
+                <a:t>80</a:t>
+              </a:r>
+            </a:p>
+          </p:txBody>
+        </p:sp>
+        <p:sp>
+          <p:nvSpPr>
+            <p:cNvPr id="31" name="TextBox 30">
+              <a:extLst>
+                <a:ext uri="{FF2B5EF4-FFF2-40B4-BE49-F238E27FC236}">
+                  <a16:creationId xmlns:a16="http://schemas.microsoft.com/office/drawing/2014/main" id="{0EC751D0-F16D-3607-A4D5-EB37E3211466}"/>
+                </a:ext>
+              </a:extLst>
+            </p:cNvPr>
+            <p:cNvSpPr txBox="1"/>
+            <p:nvPr/>
+          </p:nvSpPr>
+          <p:spPr>
+            <a:xfrm>
+              <a:off x="7880912" y="3389379"/>
+              <a:ext cx="601062" cy="400110"/>
+            </a:xfrm>
+            <a:prstGeom prst="rect">
+              <a:avLst/>
+            </a:prstGeom>
+            <a:noFill/>
+          </p:spPr>
+          <p:txBody>
+            <a:bodyPr wrap="square" rtlCol="0">
+              <a:spAutoFit/>
+            </a:bodyPr>
+            <a:lstStyle/>
+            <a:p>
+              <a:r>
+                <a:rPr lang="en-GB" sz="2000" dirty="0">
+                  <a:solidFill>
+                    <a:schemeClr val="bg1"/>
+                  </a:solidFill>
+                </a:rPr>
+                <a:t>30</a:t>
+              </a:r>
+            </a:p>
+          </p:txBody>
+        </p:sp>
+        <p:sp>
+          <p:nvSpPr>
+            <p:cNvPr id="32" name="TextBox 31">
+              <a:extLst>
+                <a:ext uri="{FF2B5EF4-FFF2-40B4-BE49-F238E27FC236}">
+                  <a16:creationId xmlns:a16="http://schemas.microsoft.com/office/drawing/2014/main" id="{D6F29648-AB2C-D96C-5746-16EA0B2B7C2E}"/>
+                </a:ext>
+              </a:extLst>
+            </p:cNvPr>
+            <p:cNvSpPr txBox="1"/>
+            <p:nvPr/>
+          </p:nvSpPr>
+          <p:spPr>
+            <a:xfrm>
+              <a:off x="8867245" y="3424736"/>
+              <a:ext cx="601062" cy="400110"/>
+            </a:xfrm>
+            <a:prstGeom prst="rect">
+              <a:avLst/>
+            </a:prstGeom>
+            <a:noFill/>
+          </p:spPr>
+          <p:txBody>
+            <a:bodyPr wrap="square" rtlCol="0">
+              <a:spAutoFit/>
+            </a:bodyPr>
+            <a:lstStyle/>
+            <a:p>
+              <a:r>
+                <a:rPr lang="en-GB" sz="2000" dirty="0">
+                  <a:solidFill>
+                    <a:schemeClr val="bg1"/>
+                  </a:solidFill>
+                </a:rPr>
+                <a:t>10</a:t>
+              </a:r>
+            </a:p>
+          </p:txBody>
+        </p:sp>
+        <p:sp>
+          <p:nvSpPr>
+            <p:cNvPr id="33" name="TextBox 32">
+              <a:extLst>
+                <a:ext uri="{FF2B5EF4-FFF2-40B4-BE49-F238E27FC236}">
+                  <a16:creationId xmlns:a16="http://schemas.microsoft.com/office/drawing/2014/main" id="{5A1C7ED2-284F-FED1-C7D1-D7B37A6AD85E}"/>
+                </a:ext>
+              </a:extLst>
+            </p:cNvPr>
+            <p:cNvSpPr txBox="1"/>
+            <p:nvPr/>
+          </p:nvSpPr>
+          <p:spPr>
+            <a:xfrm>
+              <a:off x="3781961" y="3401571"/>
+              <a:ext cx="601062" cy="400110"/>
+            </a:xfrm>
+            <a:prstGeom prst="rect">
+              <a:avLst/>
+            </a:prstGeom>
+            <a:noFill/>
+          </p:spPr>
+          <p:txBody>
+            <a:bodyPr wrap="square" rtlCol="0">
+              <a:spAutoFit/>
+            </a:bodyPr>
+            <a:lstStyle/>
+            <a:p>
+              <a:r>
+                <a:rPr lang="en-GB" sz="2000" dirty="0">
+                  <a:solidFill>
+                    <a:schemeClr val="bg1"/>
+                  </a:solidFill>
+                </a:rPr>
+                <a:t>50</a:t>
+              </a:r>
+            </a:p>
+          </p:txBody>
+        </p:sp>
+        <p:sp>
+          <p:nvSpPr>
+            <p:cNvPr id="35" name="TextBox 34">
+              <a:extLst>
+                <a:ext uri="{FF2B5EF4-FFF2-40B4-BE49-F238E27FC236}">
+                  <a16:creationId xmlns:a16="http://schemas.microsoft.com/office/drawing/2014/main" id="{DE1E43FE-B148-8E73-DFC0-1625FE03490D}"/>
+                </a:ext>
+              </a:extLst>
+            </p:cNvPr>
+            <p:cNvSpPr txBox="1"/>
+            <p:nvPr/>
+          </p:nvSpPr>
+          <p:spPr>
+            <a:xfrm>
+              <a:off x="3151635" y="3429613"/>
+              <a:ext cx="601062" cy="400110"/>
+            </a:xfrm>
+            <a:prstGeom prst="rect">
+              <a:avLst/>
+            </a:prstGeom>
+            <a:noFill/>
+          </p:spPr>
+          <p:txBody>
+            <a:bodyPr wrap="square" rtlCol="0">
+              <a:spAutoFit/>
+            </a:bodyPr>
+            <a:lstStyle/>
+            <a:p>
+              <a:r>
+                <a:rPr lang="en-GB" sz="2000" dirty="0">
+                  <a:solidFill>
+                    <a:schemeClr val="bg1"/>
+                  </a:solidFill>
+                </a:rPr>
+                <a:t>40</a:t>
+              </a:r>
+            </a:p>
+          </p:txBody>
+        </p:sp>
+        <p:sp>
+          <p:nvSpPr>
+            <p:cNvPr id="36" name="TextBox 35">
+              <a:extLst>
+                <a:ext uri="{FF2B5EF4-FFF2-40B4-BE49-F238E27FC236}">
+                  <a16:creationId xmlns:a16="http://schemas.microsoft.com/office/drawing/2014/main" id="{72B4988F-4126-B216-1DA3-6E86A2E1FDE4}"/>
+                </a:ext>
+              </a:extLst>
+            </p:cNvPr>
+            <p:cNvSpPr txBox="1"/>
+            <p:nvPr/>
+          </p:nvSpPr>
+          <p:spPr>
+            <a:xfrm>
+              <a:off x="1899516" y="3428394"/>
+              <a:ext cx="601062" cy="400110"/>
+            </a:xfrm>
+            <a:prstGeom prst="rect">
+              <a:avLst/>
+            </a:prstGeom>
+            <a:noFill/>
+          </p:spPr>
+          <p:txBody>
+            <a:bodyPr wrap="square" rtlCol="0">
+              <a:spAutoFit/>
+            </a:bodyPr>
+            <a:lstStyle/>
+            <a:p>
+              <a:r>
+                <a:rPr lang="en-GB" sz="2000" dirty="0">
+                  <a:solidFill>
+                    <a:schemeClr val="bg1"/>
+                  </a:solidFill>
+                </a:rPr>
+                <a:t>15</a:t>
+              </a:r>
+            </a:p>
+          </p:txBody>
+        </p:sp>
+      </p:grpSp>
     </p:spTree>
     <p:extLst>
       <p:ext uri="{BB962C8B-B14F-4D97-AF65-F5344CB8AC3E}">

</xml_diff>